<commit_message>
Proof reading complete; ready for migration to the WIT Computing github site
</commit_message>
<xml_diff>
--- a/topic06/talk-1/a-processing-iteration-for.pptx
+++ b/topic06/talk-1/a-processing-iteration-for.pptx
@@ -222,7 +222,7 @@
           <a:p>
             <a:fld id="{58C3D141-1E1C-433C-AD3A-CD56CBBB4F9F}" type="datetimeFigureOut">
               <a:rPr lang="en-IE" smtClean="0"/>
-              <a:t>14/01/2016</a:t>
+              <a:t>22/01/2016</a:t>
             </a:fld>
             <a:endParaRPr lang="en-IE"/>
           </a:p>
@@ -2699,7 +2699,7 @@
             <a:fld id="{1D8BD707-D9CF-40AE-B4C6-C98DA3205C09}" type="datetimeFigureOut">
               <a:rPr lang="en-US" smtClean="0"/>
               <a:pPr/>
-              <a:t>1/14/2016</a:t>
+              <a:t>1/22/2016</a:t>
             </a:fld>
             <a:endParaRPr lang="en-US"/>
           </a:p>
@@ -2873,7 +2873,7 @@
             <a:fld id="{1D8BD707-D9CF-40AE-B4C6-C98DA3205C09}" type="datetimeFigureOut">
               <a:rPr lang="en-US" smtClean="0"/>
               <a:pPr/>
-              <a:t>1/14/2016</a:t>
+              <a:t>1/22/2016</a:t>
             </a:fld>
             <a:endParaRPr lang="en-US"/>
           </a:p>
@@ -3057,7 +3057,7 @@
             <a:fld id="{1D8BD707-D9CF-40AE-B4C6-C98DA3205C09}" type="datetimeFigureOut">
               <a:rPr lang="en-US" smtClean="0"/>
               <a:pPr/>
-              <a:t>1/14/2016</a:t>
+              <a:t>1/22/2016</a:t>
             </a:fld>
             <a:endParaRPr lang="en-US"/>
           </a:p>
@@ -3242,7 +3242,7 @@
             <a:fld id="{1D8BD707-D9CF-40AE-B4C6-C98DA3205C09}" type="datetimeFigureOut">
               <a:rPr lang="en-US" smtClean="0"/>
               <a:pPr/>
-              <a:t>1/14/2016</a:t>
+              <a:t>1/22/2016</a:t>
             </a:fld>
             <a:endParaRPr lang="en-US"/>
           </a:p>
@@ -3530,7 +3530,7 @@
             <a:fld id="{1D8BD707-D9CF-40AE-B4C6-C98DA3205C09}" type="datetimeFigureOut">
               <a:rPr lang="en-US" smtClean="0"/>
               <a:pPr/>
-              <a:t>1/14/2016</a:t>
+              <a:t>1/22/2016</a:t>
             </a:fld>
             <a:endParaRPr lang="en-US"/>
           </a:p>
@@ -3833,7 +3833,7 @@
             <a:fld id="{1D8BD707-D9CF-40AE-B4C6-C98DA3205C09}" type="datetimeFigureOut">
               <a:rPr lang="en-US" smtClean="0"/>
               <a:pPr/>
-              <a:t>1/14/2016</a:t>
+              <a:t>1/22/2016</a:t>
             </a:fld>
             <a:endParaRPr lang="en-US"/>
           </a:p>
@@ -4301,7 +4301,7 @@
             <a:fld id="{1D8BD707-D9CF-40AE-B4C6-C98DA3205C09}" type="datetimeFigureOut">
               <a:rPr lang="en-US" smtClean="0"/>
               <a:pPr/>
-              <a:t>1/14/2016</a:t>
+              <a:t>1/22/2016</a:t>
             </a:fld>
             <a:endParaRPr lang="en-US"/>
           </a:p>
@@ -4469,7 +4469,7 @@
             <a:fld id="{1D8BD707-D9CF-40AE-B4C6-C98DA3205C09}" type="datetimeFigureOut">
               <a:rPr lang="en-US" smtClean="0"/>
               <a:pPr/>
-              <a:t>1/14/2016</a:t>
+              <a:t>1/22/2016</a:t>
             </a:fld>
             <a:endParaRPr lang="en-US"/>
           </a:p>
@@ -4603,7 +4603,7 @@
             <a:fld id="{1D8BD707-D9CF-40AE-B4C6-C98DA3205C09}" type="datetimeFigureOut">
               <a:rPr lang="en-US" smtClean="0"/>
               <a:pPr/>
-              <a:t>1/14/2016</a:t>
+              <a:t>1/22/2016</a:t>
             </a:fld>
             <a:endParaRPr lang="en-US"/>
           </a:p>
@@ -4884,7 +4884,7 @@
             <a:fld id="{1D8BD707-D9CF-40AE-B4C6-C98DA3205C09}" type="datetimeFigureOut">
               <a:rPr lang="en-US" smtClean="0"/>
               <a:pPr/>
-              <a:t>1/14/2016</a:t>
+              <a:t>1/22/2016</a:t>
             </a:fld>
             <a:endParaRPr lang="en-US"/>
           </a:p>
@@ -5141,7 +5141,7 @@
             <a:fld id="{1D8BD707-D9CF-40AE-B4C6-C98DA3205C09}" type="datetimeFigureOut">
               <a:rPr lang="en-US" smtClean="0"/>
               <a:pPr/>
-              <a:t>1/14/2016</a:t>
+              <a:t>1/22/2016</a:t>
             </a:fld>
             <a:endParaRPr lang="en-US"/>
           </a:p>
@@ -5358,7 +5358,7 @@
             <a:fld id="{1D8BD707-D9CF-40AE-B4C6-C98DA3205C09}" type="datetimeFigureOut">
               <a:rPr lang="en-US" smtClean="0"/>
               <a:pPr/>
-              <a:t>1/14/2016</a:t>
+              <a:t>1/22/2016</a:t>
             </a:fld>
             <a:endParaRPr lang="en-US"/>
           </a:p>
@@ -8426,8 +8426,13 @@
             <a:pPr lvl="1"/>
             <a:r>
               <a:rPr lang="en-IE" dirty="0" smtClean="0"/>
-              <a:t>For loops</a:t>
-            </a:r>
+              <a:t>For </a:t>
+            </a:r>
+            <a:r>
+              <a:rPr lang="en-IE" dirty="0" smtClean="0"/>
+              <a:t>loops (we will cover these).</a:t>
+            </a:r>
+            <a:endParaRPr lang="en-IE" dirty="0" smtClean="0"/>
           </a:p>
           <a:p>
             <a:pPr lvl="1"/>

</xml_diff>